<commit_message>
Modif de simulations et une mise a jour des images
images cross validation et RAF (Bien meilleurs!!!!!!!!!!)
</commit_message>
<xml_diff>
--- a/Remise/Remise 4/RAF.pptx
+++ b/Remise/Remise 4/RAF.pptx
@@ -233,7 +233,7 @@
           <a:p>
             <a:fld id="{33F7F89F-35B5-A34B-B7C8-DC49B77156D3}" type="datetimeFigureOut">
               <a:rPr lang="en-US" smtClean="0"/>
-              <a:t>2014-04-21</a:t>
+              <a:t>4/23/2014</a:t>
             </a:fld>
             <a:endParaRPr lang="en-US"/>
           </a:p>
@@ -392,7 +392,7 @@
           <a:p>
             <a:fld id="{B4F8E8CB-F099-334A-97A8-B886ED765ADC}" type="slidenum">
               <a:rPr lang="en-US" smtClean="0"/>
-              <a:t>‹#›</a:t>
+              <a:t>‹N°›</a:t>
             </a:fld>
             <a:endParaRPr lang="en-US"/>
           </a:p>
@@ -1483,7 +1483,7 @@
                 <a:latin typeface="Trebuchet MS"/>
               </a:rPr>
               <a:pPr/>
-              <a:t>2014-04-21</a:t>
+              <a:t>4/23/2014</a:t>
             </a:fld>
             <a:endParaRPr lang="en-US">
               <a:solidFill>
@@ -1545,7 +1545,7 @@
                 <a:latin typeface="Trebuchet MS"/>
               </a:rPr>
               <a:pPr/>
-              <a:t>‹#›</a:t>
+              <a:t>‹N°›</a:t>
             </a:fld>
             <a:endParaRPr lang="en-US">
               <a:solidFill>
@@ -1779,7 +1779,7 @@
                 <a:latin typeface="Trebuchet MS"/>
               </a:rPr>
               <a:pPr/>
-              <a:t>2014-04-21</a:t>
+              <a:t>4/23/2014</a:t>
             </a:fld>
             <a:endParaRPr lang="en-US">
               <a:solidFill>
@@ -1841,7 +1841,7 @@
                 <a:latin typeface="Trebuchet MS"/>
               </a:rPr>
               <a:pPr/>
-              <a:t>‹#›</a:t>
+              <a:t>‹N°›</a:t>
             </a:fld>
             <a:endParaRPr lang="en-US">
               <a:solidFill>
@@ -2063,7 +2063,7 @@
                 <a:latin typeface="Trebuchet MS"/>
               </a:rPr>
               <a:pPr/>
-              <a:t>2014-04-21</a:t>
+              <a:t>4/23/2014</a:t>
             </a:fld>
             <a:endParaRPr lang="en-US">
               <a:solidFill>
@@ -2125,7 +2125,7 @@
                 <a:latin typeface="Trebuchet MS"/>
               </a:rPr>
               <a:pPr/>
-              <a:t>‹#›</a:t>
+              <a:t>‹N°›</a:t>
             </a:fld>
             <a:endParaRPr lang="en-US">
               <a:solidFill>
@@ -2410,7 +2410,7 @@
                 <a:latin typeface="Trebuchet MS"/>
               </a:rPr>
               <a:pPr/>
-              <a:t>2014-04-21</a:t>
+              <a:t>4/23/2014</a:t>
             </a:fld>
             <a:endParaRPr lang="en-US">
               <a:solidFill>
@@ -2472,7 +2472,7 @@
                 <a:latin typeface="Trebuchet MS"/>
               </a:rPr>
               <a:pPr/>
-              <a:t>‹#›</a:t>
+              <a:t>‹N°›</a:t>
             </a:fld>
             <a:endParaRPr lang="en-US">
               <a:solidFill>
@@ -2783,7 +2783,7 @@
                 <a:latin typeface="Trebuchet MS"/>
               </a:rPr>
               <a:pPr/>
-              <a:t>2014-04-21</a:t>
+              <a:t>4/23/2014</a:t>
             </a:fld>
             <a:endParaRPr lang="en-US">
               <a:solidFill>
@@ -2845,7 +2845,7 @@
                 <a:latin typeface="Trebuchet MS"/>
               </a:rPr>
               <a:pPr/>
-              <a:t>‹#›</a:t>
+              <a:t>‹N°›</a:t>
             </a:fld>
             <a:endParaRPr lang="en-US">
               <a:solidFill>
@@ -3130,7 +3130,7 @@
                 <a:latin typeface="Trebuchet MS"/>
               </a:rPr>
               <a:pPr/>
-              <a:t>2014-04-21</a:t>
+              <a:t>4/23/2014</a:t>
             </a:fld>
             <a:endParaRPr lang="en-US">
               <a:solidFill>
@@ -3192,7 +3192,7 @@
                 <a:latin typeface="Trebuchet MS"/>
               </a:rPr>
               <a:pPr/>
-              <a:t>‹#›</a:t>
+              <a:t>‹N°›</a:t>
             </a:fld>
             <a:endParaRPr lang="en-US">
               <a:solidFill>
@@ -3554,7 +3554,7 @@
                 <a:latin typeface="Trebuchet MS"/>
               </a:rPr>
               <a:pPr/>
-              <a:t>2014-04-21</a:t>
+              <a:t>4/23/2014</a:t>
             </a:fld>
             <a:endParaRPr lang="en-US">
               <a:solidFill>
@@ -3616,7 +3616,7 @@
                 <a:latin typeface="Trebuchet MS"/>
               </a:rPr>
               <a:pPr/>
-              <a:t>‹#›</a:t>
+              <a:t>‹N°›</a:t>
             </a:fld>
             <a:endParaRPr lang="en-US">
               <a:solidFill>
@@ -3757,7 +3757,7 @@
                 <a:latin typeface="Trebuchet MS"/>
               </a:rPr>
               <a:pPr/>
-              <a:t>2014-04-21</a:t>
+              <a:t>4/23/2014</a:t>
             </a:fld>
             <a:endParaRPr lang="en-US">
               <a:solidFill>
@@ -3819,7 +3819,7 @@
                 <a:latin typeface="Trebuchet MS"/>
               </a:rPr>
               <a:pPr/>
-              <a:t>‹#›</a:t>
+              <a:t>‹N°›</a:t>
             </a:fld>
             <a:endParaRPr lang="en-US">
               <a:solidFill>
@@ -3970,7 +3970,7 @@
                 <a:latin typeface="Trebuchet MS"/>
               </a:rPr>
               <a:pPr/>
-              <a:t>2014-04-21</a:t>
+              <a:t>4/23/2014</a:t>
             </a:fld>
             <a:endParaRPr lang="en-US">
               <a:solidFill>
@@ -4032,7 +4032,7 @@
                 <a:latin typeface="Trebuchet MS"/>
               </a:rPr>
               <a:pPr/>
-              <a:t>‹#›</a:t>
+              <a:t>‹N°›</a:t>
             </a:fld>
             <a:endParaRPr lang="en-US">
               <a:solidFill>
@@ -4260,7 +4260,7 @@
                 <a:latin typeface="Trebuchet MS"/>
               </a:rPr>
               <a:pPr/>
-              <a:t>2014-04-21</a:t>
+              <a:t>4/23/2014</a:t>
             </a:fld>
             <a:endParaRPr lang="en-US" dirty="0">
               <a:solidFill>
@@ -4322,7 +4322,7 @@
                 <a:latin typeface="Trebuchet MS"/>
               </a:rPr>
               <a:pPr/>
-              <a:t>‹#›</a:t>
+              <a:t>‹N°›</a:t>
             </a:fld>
             <a:endParaRPr lang="en-US" dirty="0">
               <a:solidFill>
@@ -4469,7 +4469,7 @@
                 <a:latin typeface="Trebuchet MS"/>
               </a:rPr>
               <a:pPr/>
-              <a:t>2014-04-21</a:t>
+              <a:t>4/23/2014</a:t>
             </a:fld>
             <a:endParaRPr lang="en-US">
               <a:solidFill>
@@ -4531,7 +4531,7 @@
                 <a:latin typeface="Trebuchet MS"/>
               </a:rPr>
               <a:pPr/>
-              <a:t>‹#›</a:t>
+              <a:t>‹N°›</a:t>
             </a:fld>
             <a:endParaRPr lang="en-US">
               <a:solidFill>
@@ -4749,7 +4749,7 @@
                 <a:latin typeface="Trebuchet MS"/>
               </a:rPr>
               <a:pPr/>
-              <a:t>2014-04-21</a:t>
+              <a:t>4/23/2014</a:t>
             </a:fld>
             <a:endParaRPr lang="en-US">
               <a:solidFill>
@@ -4811,7 +4811,7 @@
                 <a:latin typeface="Trebuchet MS"/>
               </a:rPr>
               <a:pPr/>
-              <a:t>‹#›</a:t>
+              <a:t>‹N°›</a:t>
             </a:fld>
             <a:endParaRPr lang="en-US">
               <a:solidFill>
@@ -5014,7 +5014,7 @@
                 <a:latin typeface="Trebuchet MS"/>
               </a:rPr>
               <a:pPr/>
-              <a:t>2014-04-21</a:t>
+              <a:t>4/23/2014</a:t>
             </a:fld>
             <a:endParaRPr lang="en-US">
               <a:solidFill>
@@ -5076,7 +5076,7 @@
                 <a:latin typeface="Trebuchet MS"/>
               </a:rPr>
               <a:pPr/>
-              <a:t>‹#›</a:t>
+              <a:t>‹N°›</a:t>
             </a:fld>
             <a:endParaRPr lang="en-US">
               <a:solidFill>
@@ -5421,7 +5421,7 @@
                 <a:latin typeface="Trebuchet MS"/>
               </a:rPr>
               <a:pPr/>
-              <a:t>2014-04-21</a:t>
+              <a:t>4/23/2014</a:t>
             </a:fld>
             <a:endParaRPr lang="en-US">
               <a:solidFill>
@@ -5483,7 +5483,7 @@
                 <a:latin typeface="Trebuchet MS"/>
               </a:rPr>
               <a:pPr/>
-              <a:t>‹#›</a:t>
+              <a:t>‹N°›</a:t>
             </a:fld>
             <a:endParaRPr lang="en-US">
               <a:solidFill>
@@ -5577,7 +5577,7 @@
                 <a:latin typeface="Trebuchet MS"/>
               </a:rPr>
               <a:pPr/>
-              <a:t>2014-04-21</a:t>
+              <a:t>4/23/2014</a:t>
             </a:fld>
             <a:endParaRPr lang="en-US">
               <a:solidFill>
@@ -5639,7 +5639,7 @@
                 <a:latin typeface="Trebuchet MS"/>
               </a:rPr>
               <a:pPr/>
-              <a:t>‹#›</a:t>
+              <a:t>‹N°›</a:t>
             </a:fld>
             <a:endParaRPr lang="en-US">
               <a:solidFill>
@@ -5705,7 +5705,7 @@
                 <a:latin typeface="Trebuchet MS"/>
               </a:rPr>
               <a:pPr/>
-              <a:t>2014-04-21</a:t>
+              <a:t>4/23/2014</a:t>
             </a:fld>
             <a:endParaRPr lang="en-US">
               <a:solidFill>
@@ -5767,7 +5767,7 @@
                 <a:latin typeface="Trebuchet MS"/>
               </a:rPr>
               <a:pPr/>
-              <a:t>‹#›</a:t>
+              <a:t>‹N°›</a:t>
             </a:fld>
             <a:endParaRPr lang="en-US">
               <a:solidFill>
@@ -5838,7 +5838,7 @@
                 <a:latin typeface="Trebuchet MS"/>
               </a:rPr>
               <a:pPr/>
-              <a:t>2014-04-21</a:t>
+              <a:t>4/23/2014</a:t>
             </a:fld>
             <a:endParaRPr lang="en-US" dirty="0">
               <a:solidFill>
@@ -5910,7 +5910,7 @@
                 <a:latin typeface="Trebuchet MS"/>
               </a:rPr>
               <a:pPr/>
-              <a:t>‹#›</a:t>
+              <a:t>‹N°›</a:t>
             </a:fld>
             <a:endParaRPr lang="en-US">
               <a:solidFill>
@@ -6666,7 +6666,7 @@
                 <a:latin typeface="Trebuchet MS"/>
               </a:rPr>
               <a:pPr/>
-              <a:t>2014-04-21</a:t>
+              <a:t>4/23/2014</a:t>
             </a:fld>
             <a:endParaRPr lang="en-US">
               <a:solidFill>
@@ -6728,7 +6728,7 @@
                 <a:latin typeface="Trebuchet MS"/>
               </a:rPr>
               <a:pPr/>
-              <a:t>‹#›</a:t>
+              <a:t>‹N°›</a:t>
             </a:fld>
             <a:endParaRPr lang="en-US">
               <a:solidFill>
@@ -7462,7 +7462,7 @@
                 <a:latin typeface="Trebuchet MS"/>
               </a:rPr>
               <a:pPr defTabSz="914400"/>
-              <a:t>2014-04-21</a:t>
+              <a:t>4/23/2014</a:t>
             </a:fld>
             <a:endParaRPr lang="en-US">
               <a:solidFill>
@@ -7560,7 +7560,7 @@
                 <a:latin typeface="Trebuchet MS"/>
               </a:rPr>
               <a:pPr defTabSz="914400"/>
-              <a:t>‹#›</a:t>
+              <a:t>‹N°›</a:t>
             </a:fld>
             <a:endParaRPr lang="en-US">
               <a:solidFill>
@@ -8110,7 +8110,7 @@
   <p:timing>
     <p:tnLst>
       <p:par>
-        <p:cTn xmlns:p14="http://schemas.microsoft.com/office/powerpoint/2010/main" id="1" dur="indefinite" restart="never" nodeType="tmRoot"/>
+        <p:cTn id="1" dur="indefinite" restart="never" nodeType="tmRoot"/>
       </p:par>
     </p:tnLst>
   </p:timing>
@@ -8575,9 +8575,9 @@
       </p:sp>
       <p:pic>
         <p:nvPicPr>
-          <p:cNvPr id="6" name="Picture 5" descr="cour_al.JPG"/>
+          <p:cNvPr id="1026" name="Picture 2" descr="D:\LiberT\Documents\GitHub\DesignIV\Remise\Documentation_technique\Validation_croisee\fig\DCP_AFE\1u\cour_al.JPG"/>
           <p:cNvPicPr>
-            <a:picLocks noChangeAspect="1"/>
+            <a:picLocks noChangeAspect="1" noChangeArrowheads="1"/>
           </p:cNvPicPr>
           <p:nvPr/>
         </p:nvPicPr>
@@ -8589,18 +8589,29 @@
               </a:ext>
             </a:extLst>
           </a:blip>
+          <a:srcRect/>
           <a:stretch>
             <a:fillRect/>
           </a:stretch>
         </p:blipFill>
-        <p:spPr>
+        <p:spPr bwMode="auto">
           <a:xfrm>
-            <a:off x="254001" y="2068185"/>
-            <a:ext cx="9144000" cy="4098578"/>
+            <a:off x="432080" y="1828799"/>
+            <a:ext cx="8792308" cy="4778603"/>
           </a:xfrm>
           <a:prstGeom prst="rect">
             <a:avLst/>
           </a:prstGeom>
+          <a:noFill/>
+          <a:extLst>
+            <a:ext uri="{909E8E84-426E-40DD-AFC4-6F175D3DCCD1}">
+              <a14:hiddenFill xmlns:a14="http://schemas.microsoft.com/office/drawing/2010/main">
+                <a:solidFill>
+                  <a:srgbClr val="FFFFFF"/>
+                </a:solidFill>
+              </a14:hiddenFill>
+            </a:ext>
+          </a:extLst>
         </p:spPr>
       </p:pic>
     </p:spTree>
@@ -8674,9 +8685,9 @@
       </p:sp>
       <p:pic>
         <p:nvPicPr>
-          <p:cNvPr id="3" name="Picture 2" descr="ten_ligne_ligne.JPG"/>
+          <p:cNvPr id="2050" name="Picture 2" descr="D:\LiberT\Documents\GitHub\DesignIV\Remise\Documentation_technique\Validation_croisee\fig\DCP_AFE\1u\ten_ligne_ligne.JPG"/>
           <p:cNvPicPr>
-            <a:picLocks noChangeAspect="1"/>
+            <a:picLocks noChangeAspect="1" noChangeArrowheads="1"/>
           </p:cNvPicPr>
           <p:nvPr/>
         </p:nvPicPr>
@@ -8688,18 +8699,29 @@
               </a:ext>
             </a:extLst>
           </a:blip>
+          <a:srcRect/>
           <a:stretch>
             <a:fillRect/>
           </a:stretch>
         </p:blipFill>
-        <p:spPr>
+        <p:spPr bwMode="auto">
           <a:xfrm>
-            <a:off x="120315" y="2207270"/>
-            <a:ext cx="9144000" cy="4061051"/>
+            <a:off x="361739" y="1808704"/>
+            <a:ext cx="8440617" cy="4869856"/>
           </a:xfrm>
           <a:prstGeom prst="rect">
             <a:avLst/>
           </a:prstGeom>
+          <a:noFill/>
+          <a:extLst>
+            <a:ext uri="{909E8E84-426E-40DD-AFC4-6F175D3DCCD1}">
+              <a14:hiddenFill xmlns:a14="http://schemas.microsoft.com/office/drawing/2010/main">
+                <a:solidFill>
+                  <a:srgbClr val="FFFFFF"/>
+                </a:solidFill>
+              </a14:hiddenFill>
+            </a:ext>
+          </a:extLst>
         </p:spPr>
       </p:pic>
     </p:spTree>
@@ -8765,9 +8787,9 @@
       </p:sp>
       <p:pic>
         <p:nvPicPr>
-          <p:cNvPr id="4" name="Picture 3" descr="cou_IGBT_afe.JPG"/>
+          <p:cNvPr id="3074" name="Picture 2" descr="D:\LiberT\Documents\GitHub\DesignIV\Remise\Documentation_technique\Validation_croisee\fig\DCP_AFE\1u\cou_IGBT_afe.JPG"/>
           <p:cNvPicPr>
-            <a:picLocks noChangeAspect="1"/>
+            <a:picLocks noChangeAspect="1" noChangeArrowheads="1"/>
           </p:cNvPicPr>
           <p:nvPr/>
         </p:nvPicPr>
@@ -8779,18 +8801,29 @@
               </a:ext>
             </a:extLst>
           </a:blip>
+          <a:srcRect/>
           <a:stretch>
             <a:fillRect/>
           </a:stretch>
         </p:blipFill>
-        <p:spPr>
+        <p:spPr bwMode="auto">
           <a:xfrm>
-            <a:off x="80208" y="2243279"/>
-            <a:ext cx="9144000" cy="3882074"/>
+            <a:off x="508001" y="1688125"/>
+            <a:ext cx="8294356" cy="4893545"/>
           </a:xfrm>
           <a:prstGeom prst="rect">
             <a:avLst/>
           </a:prstGeom>
+          <a:noFill/>
+          <a:extLst>
+            <a:ext uri="{909E8E84-426E-40DD-AFC4-6F175D3DCCD1}">
+              <a14:hiddenFill xmlns:a14="http://schemas.microsoft.com/office/drawing/2010/main">
+                <a:solidFill>
+                  <a:srgbClr val="FFFFFF"/>
+                </a:solidFill>
+              </a14:hiddenFill>
+            </a:ext>
+          </a:extLst>
         </p:spPr>
       </p:pic>
     </p:spTree>
@@ -8856,9 +8889,9 @@
       </p:sp>
       <p:pic>
         <p:nvPicPr>
-          <p:cNvPr id="3" name="Picture 2" descr="IGBT_afe_tension.JPG"/>
+          <p:cNvPr id="4098" name="Picture 2" descr="D:\LiberT\Documents\GitHub\DesignIV\Remise\Documentation_technique\Validation_croisee\fig\DCP_AFE\1u\IGBT_afe.JPG"/>
           <p:cNvPicPr>
-            <a:picLocks noChangeAspect="1"/>
+            <a:picLocks noChangeAspect="1" noChangeArrowheads="1"/>
           </p:cNvPicPr>
           <p:nvPr/>
         </p:nvPicPr>
@@ -8870,18 +8903,29 @@
               </a:ext>
             </a:extLst>
           </a:blip>
+          <a:srcRect/>
           <a:stretch>
             <a:fillRect/>
           </a:stretch>
         </p:blipFill>
-        <p:spPr>
+        <p:spPr bwMode="auto">
           <a:xfrm>
-            <a:off x="0" y="2188317"/>
-            <a:ext cx="9144000" cy="3885050"/>
+            <a:off x="286937" y="1930400"/>
+            <a:ext cx="8696289" cy="4714876"/>
           </a:xfrm>
           <a:prstGeom prst="rect">
             <a:avLst/>
           </a:prstGeom>
+          <a:noFill/>
+          <a:extLst>
+            <a:ext uri="{909E8E84-426E-40DD-AFC4-6F175D3DCCD1}">
+              <a14:hiddenFill xmlns:a14="http://schemas.microsoft.com/office/drawing/2010/main">
+                <a:solidFill>
+                  <a:srgbClr val="FFFFFF"/>
+                </a:solidFill>
+              </a14:hiddenFill>
+            </a:ext>
+          </a:extLst>
         </p:spPr>
       </p:pic>
     </p:spTree>
@@ -8951,7 +8995,7 @@
       </p:sp>
       <p:pic>
         <p:nvPicPr>
-          <p:cNvPr id="1026" name="Picture 2" descr="D:\LiberT\Documents\GitHub\DesignIV\Remise\Documentation_technique\Validation_croisee\fig\DCP_AFE\5u\ten_bus.JPG"/>
+          <p:cNvPr id="5122" name="Picture 2" descr="D:\LiberT\Documents\GitHub\DesignIV\Remise\Documentation_technique\Validation_croisee\fig\DCP_AFE\1u\ten_bus.JPG"/>
           <p:cNvPicPr>
             <a:picLocks noChangeAspect="1" noChangeArrowheads="1"/>
           </p:cNvPicPr>
@@ -8972,15 +9016,15 @@
         </p:blipFill>
         <p:spPr bwMode="auto">
           <a:xfrm>
-            <a:off x="214134" y="2180492"/>
-            <a:ext cx="9470924" cy="4206997"/>
+            <a:off x="508001" y="1828800"/>
+            <a:ext cx="8354645" cy="4872823"/>
           </a:xfrm>
           <a:prstGeom prst="rect">
             <a:avLst/>
           </a:prstGeom>
           <a:noFill/>
           <a:extLst>
-            <a:ext uri="{909E8E84-426E-40dd-AFC4-6F175D3DCCD1}">
+            <a:ext uri="{909E8E84-426E-40DD-AFC4-6F175D3DCCD1}">
               <a14:hiddenFill xmlns:a14="http://schemas.microsoft.com/office/drawing/2010/main">
                 <a:solidFill>
                   <a:srgbClr val="FFFFFF"/>
@@ -9053,9 +9097,9 @@
       </p:sp>
       <p:pic>
         <p:nvPicPr>
-          <p:cNvPr id="3" name="Picture 2" descr="cour_ch.JPG"/>
+          <p:cNvPr id="1026" name="Picture 2" descr="D:\LiberT\Documents\GitHub\DesignIV\Remise\Documentation_technique\Validation_croisee\fig\DCP_AFE\1u\cour_ch.JPG"/>
           <p:cNvPicPr>
-            <a:picLocks noChangeAspect="1"/>
+            <a:picLocks noChangeAspect="1" noChangeArrowheads="1"/>
           </p:cNvPicPr>
           <p:nvPr/>
         </p:nvPicPr>
@@ -9067,18 +9111,29 @@
               </a:ext>
             </a:extLst>
           </a:blip>
+          <a:srcRect/>
           <a:stretch>
             <a:fillRect/>
           </a:stretch>
         </p:blipFill>
-        <p:spPr>
+        <p:spPr bwMode="auto">
           <a:xfrm>
-            <a:off x="173790" y="1923904"/>
-            <a:ext cx="9144000" cy="4773680"/>
+            <a:off x="251209" y="1930401"/>
+            <a:ext cx="8601389" cy="4741704"/>
           </a:xfrm>
           <a:prstGeom prst="rect">
             <a:avLst/>
           </a:prstGeom>
+          <a:noFill/>
+          <a:extLst>
+            <a:ext uri="{909E8E84-426E-40DD-AFC4-6F175D3DCCD1}">
+              <a14:hiddenFill xmlns:a14="http://schemas.microsoft.com/office/drawing/2010/main">
+                <a:solidFill>
+                  <a:srgbClr val="FFFFFF"/>
+                </a:solidFill>
+              </a14:hiddenFill>
+            </a:ext>
+          </a:extLst>
         </p:spPr>
       </p:pic>
     </p:spTree>
@@ -9287,14 +9342,14 @@
             <a:noFill/>
           </a:ln>
           <a:extLst>
-            <a:ext uri="{909E8E84-426E-40dd-AFC4-6F175D3DCCD1}">
+            <a:ext uri="{909E8E84-426E-40DD-AFC4-6F175D3DCCD1}">
               <a14:hiddenFill xmlns:a14="http://schemas.microsoft.com/office/drawing/2010/main">
                 <a:solidFill>
                   <a:srgbClr val="FFFFFF"/>
                 </a:solidFill>
               </a14:hiddenFill>
             </a:ext>
-            <a:ext uri="{91240B29-F687-4f45-9708-019B960494DF}">
+            <a:ext uri="{91240B29-F687-4F45-9708-019B960494DF}">
               <a14:hiddenLine xmlns:a14="http://schemas.microsoft.com/office/drawing/2010/main" w="9525">
                 <a:solidFill>
                   <a:srgbClr val="000000"/>
@@ -9374,7 +9429,7 @@
   <p:timing>
     <p:tnLst>
       <p:par>
-        <p:cTn xmlns:p14="http://schemas.microsoft.com/office/powerpoint/2010/main" id="1" dur="indefinite" restart="never" nodeType="tmRoot"/>
+        <p:cTn id="1" dur="indefinite" restart="never" nodeType="tmRoot"/>
       </p:par>
     </p:tnLst>
   </p:timing>
@@ -9431,9 +9486,9 @@
       </p:sp>
       <p:pic>
         <p:nvPicPr>
-          <p:cNvPr id="4" name="Picture 3" descr="hash_cou_IGBT-1.JPG"/>
+          <p:cNvPr id="2050" name="Picture 2" descr="D:\LiberT\Documents\GitHub\DesignIV\Remise\Documentation_technique\Validation_croisee\fig\DCP_AFE\1u\hash_cou_IGBT.JPG"/>
           <p:cNvPicPr>
-            <a:picLocks noChangeAspect="1"/>
+            <a:picLocks noChangeAspect="1" noChangeArrowheads="1"/>
           </p:cNvPicPr>
           <p:nvPr/>
         </p:nvPicPr>
@@ -9445,18 +9500,29 @@
               </a:ext>
             </a:extLst>
           </a:blip>
+          <a:srcRect/>
           <a:stretch>
             <a:fillRect/>
           </a:stretch>
         </p:blipFill>
-        <p:spPr>
+        <p:spPr bwMode="auto">
           <a:xfrm>
-            <a:off x="120318" y="2157592"/>
-            <a:ext cx="8930106" cy="3878994"/>
+            <a:off x="713434" y="1930400"/>
+            <a:ext cx="7998488" cy="4601030"/>
           </a:xfrm>
           <a:prstGeom prst="rect">
             <a:avLst/>
           </a:prstGeom>
+          <a:noFill/>
+          <a:extLst>
+            <a:ext uri="{909E8E84-426E-40DD-AFC4-6F175D3DCCD1}">
+              <a14:hiddenFill xmlns:a14="http://schemas.microsoft.com/office/drawing/2010/main">
+                <a:solidFill>
+                  <a:srgbClr val="FFFFFF"/>
+                </a:solidFill>
+              </a14:hiddenFill>
+            </a:ext>
+          </a:extLst>
         </p:spPr>
       </p:pic>
     </p:spTree>
@@ -9638,7 +9704,7 @@
         </p:nvGraphicFramePr>
         <p:xfrm>
           <a:off x="101601" y="615406"/>
-          <a:ext cx="9042400" cy="6208768"/>
+          <a:ext cx="9042400" cy="6137706"/>
         </p:xfrm>
         <a:graphic>
           <a:graphicData uri="http://schemas.openxmlformats.org/drawingml/2006/table">
@@ -13311,7 +13377,7 @@
   <p:timing>
     <p:tnLst>
       <p:par>
-        <p:cTn xmlns:p14="http://schemas.microsoft.com/office/powerpoint/2010/main" id="1" dur="indefinite" restart="never" nodeType="tmRoot"/>
+        <p:cTn id="1" dur="indefinite" restart="never" nodeType="tmRoot"/>
       </p:par>
     </p:tnLst>
   </p:timing>
@@ -15459,7 +15525,7 @@
   <p:timing>
     <p:tnLst>
       <p:par>
-        <p:cTn xmlns:p14="http://schemas.microsoft.com/office/powerpoint/2010/main" id="1" dur="indefinite" restart="never" nodeType="tmRoot"/>
+        <p:cTn id="1" dur="indefinite" restart="never" nodeType="tmRoot"/>
       </p:par>
     </p:tnLst>
   </p:timing>
@@ -15558,7 +15624,7 @@
   <p:timing>
     <p:tnLst>
       <p:par>
-        <p:cTn xmlns:p14="http://schemas.microsoft.com/office/powerpoint/2010/main" id="1" dur="indefinite" restart="never" nodeType="tmRoot"/>
+        <p:cTn id="1" dur="indefinite" restart="never" nodeType="tmRoot"/>
       </p:par>
     </p:tnLst>
   </p:timing>
@@ -15656,7 +15722,7 @@
   <p:timing>
     <p:tnLst>
       <p:par>
-        <p:cTn xmlns:p14="http://schemas.microsoft.com/office/powerpoint/2010/main" id="1" dur="indefinite" restart="never" nodeType="tmRoot"/>
+        <p:cTn id="1" dur="indefinite" restart="never" nodeType="tmRoot"/>
       </p:par>
     </p:tnLst>
   </p:timing>
@@ -15950,7 +16016,7 @@
   <p:timing>
     <p:tnLst>
       <p:par>
-        <p:cTn xmlns:p14="http://schemas.microsoft.com/office/powerpoint/2010/main" id="1" dur="indefinite" restart="never" nodeType="tmRoot"/>
+        <p:cTn id="1" dur="indefinite" restart="never" nodeType="tmRoot"/>
       </p:par>
     </p:tnLst>
   </p:timing>
@@ -16476,7 +16542,7 @@
   <p:timing>
     <p:tnLst>
       <p:par>
-        <p:cTn xmlns:p14="http://schemas.microsoft.com/office/powerpoint/2010/main" id="1" dur="indefinite" restart="never" nodeType="tmRoot"/>
+        <p:cTn id="1" dur="indefinite" restart="never" nodeType="tmRoot"/>
       </p:par>
     </p:tnLst>
   </p:timing>
@@ -17106,7 +17172,7 @@
   <p:timing>
     <p:tnLst>
       <p:par>
-        <p:cTn xmlns:p14="http://schemas.microsoft.com/office/powerpoint/2010/main" id="1" dur="indefinite" restart="never" nodeType="tmRoot"/>
+        <p:cTn id="1" dur="indefinite" restart="never" nodeType="tmRoot"/>
       </p:par>
     </p:tnLst>
   </p:timing>
@@ -17239,7 +17305,7 @@
   <p:timing>
     <p:tnLst>
       <p:par>
-        <p:cTn xmlns:p14="http://schemas.microsoft.com/office/powerpoint/2010/main" id="1" dur="indefinite" restart="never" nodeType="tmRoot"/>
+        <p:cTn id="1" dur="indefinite" restart="never" nodeType="tmRoot"/>
       </p:par>
     </p:tnLst>
   </p:timing>
@@ -17374,7 +17440,7 @@
   <p:timing>
     <p:tnLst>
       <p:par>
-        <p:cTn xmlns:p14="http://schemas.microsoft.com/office/powerpoint/2010/main" id="1" dur="indefinite" restart="never" nodeType="tmRoot"/>
+        <p:cTn id="1" dur="indefinite" restart="never" nodeType="tmRoot"/>
       </p:par>
     </p:tnLst>
   </p:timing>

</xml_diff>